<commit_message>
Stuff, plus offline slide
</commit_message>
<xml_diff>
--- a/Offline Slide.pptx
+++ b/Offline Slide.pptx
@@ -6,7 +6,8 @@
   </p:sldMasterIdLst>
   <p:sldIdLst>
     <p:sldId id="261" r:id="rId2"/>
-    <p:sldId id="260" r:id="rId3"/>
+    <p:sldId id="262" r:id="rId3"/>
+    <p:sldId id="260" r:id="rId4"/>
   </p:sldIdLst>
   <p:sldSz cx="12192000" cy="6858000"/>
   <p:notesSz cx="6858000" cy="9144000"/>
@@ -260,7 +261,7 @@
           <a:p>
             <a:fld id="{D1CBADBE-F29A-4ACB-86A5-2945DAC5A707}" type="datetimeFigureOut">
               <a:rPr lang="en-US" smtClean="0"/>
-              <a:t>1/3/2019</a:t>
+              <a:t>8/4/19</a:t>
             </a:fld>
             <a:endParaRPr lang="en-US"/>
           </a:p>
@@ -458,7 +459,7 @@
           <a:p>
             <a:fld id="{D1CBADBE-F29A-4ACB-86A5-2945DAC5A707}" type="datetimeFigureOut">
               <a:rPr lang="en-US" smtClean="0"/>
-              <a:t>1/3/2019</a:t>
+              <a:t>8/4/19</a:t>
             </a:fld>
             <a:endParaRPr lang="en-US"/>
           </a:p>
@@ -666,7 +667,7 @@
           <a:p>
             <a:fld id="{D1CBADBE-F29A-4ACB-86A5-2945DAC5A707}" type="datetimeFigureOut">
               <a:rPr lang="en-US" smtClean="0"/>
-              <a:t>1/3/2019</a:t>
+              <a:t>8/4/19</a:t>
             </a:fld>
             <a:endParaRPr lang="en-US"/>
           </a:p>
@@ -864,7 +865,7 @@
           <a:p>
             <a:fld id="{D1CBADBE-F29A-4ACB-86A5-2945DAC5A707}" type="datetimeFigureOut">
               <a:rPr lang="en-US" smtClean="0"/>
-              <a:t>1/3/2019</a:t>
+              <a:t>8/4/19</a:t>
             </a:fld>
             <a:endParaRPr lang="en-US"/>
           </a:p>
@@ -1139,7 +1140,7 @@
           <a:p>
             <a:fld id="{D1CBADBE-F29A-4ACB-86A5-2945DAC5A707}" type="datetimeFigureOut">
               <a:rPr lang="en-US" smtClean="0"/>
-              <a:t>1/3/2019</a:t>
+              <a:t>8/4/19</a:t>
             </a:fld>
             <a:endParaRPr lang="en-US"/>
           </a:p>
@@ -1404,7 +1405,7 @@
           <a:p>
             <a:fld id="{D1CBADBE-F29A-4ACB-86A5-2945DAC5A707}" type="datetimeFigureOut">
               <a:rPr lang="en-US" smtClean="0"/>
-              <a:t>1/3/2019</a:t>
+              <a:t>8/4/19</a:t>
             </a:fld>
             <a:endParaRPr lang="en-US"/>
           </a:p>
@@ -1906,7 +1907,7 @@
           <a:p>
             <a:fld id="{D1CBADBE-F29A-4ACB-86A5-2945DAC5A707}" type="datetimeFigureOut">
               <a:rPr lang="en-US" smtClean="0"/>
-              <a:t>1/3/2019</a:t>
+              <a:t>8/4/19</a:t>
             </a:fld>
             <a:endParaRPr lang="en-US"/>
           </a:p>
@@ -2047,7 +2048,7 @@
           <a:p>
             <a:fld id="{D1CBADBE-F29A-4ACB-86A5-2945DAC5A707}" type="datetimeFigureOut">
               <a:rPr lang="en-US" smtClean="0"/>
-              <a:t>1/3/2019</a:t>
+              <a:t>8/4/19</a:t>
             </a:fld>
             <a:endParaRPr lang="en-US"/>
           </a:p>
@@ -2160,7 +2161,7 @@
           <a:p>
             <a:fld id="{D1CBADBE-F29A-4ACB-86A5-2945DAC5A707}" type="datetimeFigureOut">
               <a:rPr lang="en-US" smtClean="0"/>
-              <a:t>1/3/2019</a:t>
+              <a:t>8/4/19</a:t>
             </a:fld>
             <a:endParaRPr lang="en-US"/>
           </a:p>
@@ -2471,7 +2472,7 @@
           <a:p>
             <a:fld id="{D1CBADBE-F29A-4ACB-86A5-2945DAC5A707}" type="datetimeFigureOut">
               <a:rPr lang="en-US" smtClean="0"/>
-              <a:t>1/3/2019</a:t>
+              <a:t>8/4/19</a:t>
             </a:fld>
             <a:endParaRPr lang="en-US"/>
           </a:p>
@@ -2759,7 +2760,7 @@
           <a:p>
             <a:fld id="{D1CBADBE-F29A-4ACB-86A5-2945DAC5A707}" type="datetimeFigureOut">
               <a:rPr lang="en-US" smtClean="0"/>
-              <a:t>1/3/2019</a:t>
+              <a:t>8/4/19</a:t>
             </a:fld>
             <a:endParaRPr lang="en-US"/>
           </a:p>
@@ -3003,7 +3004,7 @@
           <a:p>
             <a:fld id="{D1CBADBE-F29A-4ACB-86A5-2945DAC5A707}" type="datetimeFigureOut">
               <a:rPr lang="en-US" smtClean="0"/>
-              <a:t>1/3/2019</a:t>
+              <a:t>8/4/19</a:t>
             </a:fld>
             <a:endParaRPr lang="en-US"/>
           </a:p>
@@ -3634,7 +3635,47 @@
                 <a:ea typeface="Open Sans" panose="020B0606030504020204" pitchFamily="34" charset="0"/>
                 <a:cs typeface="Open Sans" panose="020B0606030504020204" pitchFamily="34" charset="0"/>
               </a:rPr>
-              <a:t>Please join us for Sunday Worship each Sunday at 10:30 AM CST.</a:t>
+              <a:t>Please join us for Sunday Worship each Sunday at 10:30 </a:t>
+            </a:r>
+            <a:r>
+              <a:rPr lang="en-US" sz="2400">
+                <a:solidFill>
+                  <a:schemeClr val="bg1">
+                    <a:lumMod val="85000"/>
+                  </a:schemeClr>
+                </a:solidFill>
+                <a:effectLst>
+                  <a:outerShdw blurRad="50800" dist="38100" dir="2700000" algn="tl" rotWithShape="0">
+                    <a:prstClr val="black">
+                      <a:alpha val="40000"/>
+                    </a:prstClr>
+                  </a:outerShdw>
+                </a:effectLst>
+                <a:latin typeface="Open Sans" panose="020B0606030504020204" pitchFamily="34" charset="0"/>
+                <a:ea typeface="Open Sans" panose="020B0606030504020204" pitchFamily="34" charset="0"/>
+                <a:cs typeface="Open Sans" panose="020B0606030504020204" pitchFamily="34" charset="0"/>
+              </a:rPr>
+              <a:t>AM CDT</a:t>
+            </a:r>
+            <a:r>
+              <a:rPr lang="en-US" sz="2400" dirty="0">
+                <a:solidFill>
+                  <a:schemeClr val="bg1">
+                    <a:lumMod val="85000"/>
+                  </a:schemeClr>
+                </a:solidFill>
+                <a:effectLst>
+                  <a:outerShdw blurRad="50800" dist="38100" dir="2700000" algn="tl" rotWithShape="0">
+                    <a:prstClr val="black">
+                      <a:alpha val="40000"/>
+                    </a:prstClr>
+                  </a:outerShdw>
+                </a:effectLst>
+                <a:latin typeface="Open Sans" panose="020B0606030504020204" pitchFamily="34" charset="0"/>
+                <a:ea typeface="Open Sans" panose="020B0606030504020204" pitchFamily="34" charset="0"/>
+                <a:cs typeface="Open Sans" panose="020B0606030504020204" pitchFamily="34" charset="0"/>
+              </a:rPr>
+              <a:t>.</a:t>
             </a:r>
           </a:p>
         </p:txBody>
@@ -3737,7 +3778,7 @@
           <p:nvPr>
             <p:extLst>
               <p:ext uri="{D42A27DB-BD31-4B8C-83A1-F6EECF244321}">
-                <p14:modId xmlns:p14="http://schemas.microsoft.com/office/powerpoint/2010/main" val="278875192"/>
+                <p14:modId xmlns:p14="http://schemas.microsoft.com/office/powerpoint/2010/main" val="1736568232"/>
               </p:ext>
             </p:extLst>
           </p:nvPr>
@@ -3788,7 +3829,7 @@
                             <a:schemeClr val="bg1"/>
                           </a:solidFill>
                         </a:rPr>
-                        <a:t>Sun, 1/6/19</a:t>
+                        <a:t>Sun, 8/11/19</a:t>
                       </a:r>
                     </a:p>
                   </a:txBody>
@@ -3816,21 +3857,8 @@
                             <a:schemeClr val="bg1"/>
                           </a:solidFill>
                         </a:rPr>
-                        <a:t>Sun</a:t>
+                        <a:t>Sun, 8/18/19</a:t>
                       </a:r>
-                      <a:r>
-                        <a:rPr lang="en-US" sz="2000" b="1">
-                          <a:solidFill>
-                            <a:schemeClr val="bg1"/>
-                          </a:solidFill>
-                        </a:rPr>
-                        <a:t>, 1/13/19</a:t>
-                      </a:r>
-                      <a:endParaRPr lang="en-US" sz="2000" b="1" dirty="0">
-                        <a:solidFill>
-                          <a:schemeClr val="bg1"/>
-                        </a:solidFill>
-                      </a:endParaRPr>
                     </a:p>
                   </a:txBody>
                   <a:tcPr marL="45720" marR="45720" anchor="b">
@@ -3866,7 +3894,837 @@
                             <a:schemeClr val="bg1"/>
                           </a:solidFill>
                         </a:rPr>
+                        <a:t>Sun, 8/25/19</a:t>
+                      </a:r>
+                    </a:p>
+                  </a:txBody>
+                  <a:tcPr marL="45720" marR="45720" anchor="b">
+                    <a:lnL w="38100" cap="flat" cmpd="sng" algn="ctr">
+                      <a:solidFill>
+                        <a:schemeClr val="bg1"/>
+                      </a:solidFill>
+                      <a:prstDash val="solid"/>
+                      <a:round/>
+                      <a:headEnd type="none" w="med" len="med"/>
+                      <a:tailEnd type="none" w="med" len="med"/>
+                    </a:lnL>
+                  </a:tcPr>
+                </a:tc>
+                <a:extLst>
+                  <a:ext uri="{0D108BD9-81ED-4DB2-BD59-A6C34878D82A}">
+                    <a16:rowId xmlns:a16="http://schemas.microsoft.com/office/drawing/2014/main" val="3791071699"/>
+                  </a:ext>
+                </a:extLst>
+              </a:tr>
+              <a:tr h="473040">
+                <a:tc>
+                  <a:txBody>
+                    <a:bodyPr/>
+                    <a:lstStyle/>
+                    <a:p>
+                      <a:pPr algn="ctr"/>
+                      <a:r>
+                        <a:rPr lang="en-US" sz="2000" b="1" dirty="0">
+                          <a:solidFill>
+                            <a:schemeClr val="bg1"/>
+                          </a:solidFill>
+                        </a:rPr>
+                        <a:t>10:30 AM CDT • </a:t>
+                      </a:r>
+                      <a:r>
+                        <a:rPr lang="en-US" sz="2000" b="1" u="none" dirty="0">
+                          <a:solidFill>
+                            <a:schemeClr val="bg1"/>
+                          </a:solidFill>
+                        </a:rPr>
+                        <a:t>15:30 PM UTC</a:t>
+                      </a:r>
+                    </a:p>
+                  </a:txBody>
+                  <a:tcPr marL="45720" marR="45720" anchor="ctr">
+                    <a:lnR w="38100" cap="flat" cmpd="sng" algn="ctr">
+                      <a:solidFill>
+                        <a:schemeClr val="bg1"/>
+                      </a:solidFill>
+                      <a:prstDash val="solid"/>
+                      <a:round/>
+                      <a:headEnd type="none" w="med" len="med"/>
+                      <a:tailEnd type="none" w="med" len="med"/>
+                    </a:lnR>
+                  </a:tcPr>
+                </a:tc>
+                <a:tc>
+                  <a:txBody>
+                    <a:bodyPr/>
+                    <a:lstStyle/>
+                    <a:p>
+                      <a:pPr algn="ctr"/>
+                      <a:r>
+                        <a:rPr lang="en-US" sz="2000" b="1" dirty="0">
+                          <a:solidFill>
+                            <a:schemeClr val="bg1"/>
+                          </a:solidFill>
+                        </a:rPr>
+                        <a:t>10:30 AM CDT • </a:t>
+                      </a:r>
+                      <a:r>
+                        <a:rPr lang="en-US" sz="2000" b="1" u="none" dirty="0">
+                          <a:solidFill>
+                            <a:schemeClr val="bg1"/>
+                          </a:solidFill>
+                        </a:rPr>
+                        <a:t>15:30 PM UTC</a:t>
+                      </a:r>
+                    </a:p>
+                  </a:txBody>
+                  <a:tcPr marL="45720" marR="45720" anchor="ctr">
+                    <a:lnL w="38100" cap="flat" cmpd="sng" algn="ctr">
+                      <a:solidFill>
+                        <a:schemeClr val="bg1"/>
+                      </a:solidFill>
+                      <a:prstDash val="solid"/>
+                      <a:round/>
+                      <a:headEnd type="none" w="med" len="med"/>
+                      <a:tailEnd type="none" w="med" len="med"/>
+                    </a:lnL>
+                    <a:lnR w="38100" cap="flat" cmpd="sng" algn="ctr">
+                      <a:solidFill>
+                        <a:schemeClr val="bg1"/>
+                      </a:solidFill>
+                      <a:prstDash val="solid"/>
+                      <a:round/>
+                      <a:headEnd type="none" w="med" len="med"/>
+                      <a:tailEnd type="none" w="med" len="med"/>
+                    </a:lnR>
+                  </a:tcPr>
+                </a:tc>
+                <a:tc>
+                  <a:txBody>
+                    <a:bodyPr/>
+                    <a:lstStyle/>
+                    <a:p>
+                      <a:pPr algn="ctr"/>
+                      <a:r>
+                        <a:rPr lang="en-US" sz="2000" b="1" dirty="0">
+                          <a:solidFill>
+                            <a:schemeClr val="bg1"/>
+                          </a:solidFill>
+                        </a:rPr>
+                        <a:t>10:30 AM CDT • </a:t>
+                      </a:r>
+                      <a:r>
+                        <a:rPr lang="en-US" sz="2000" b="1" u="none" dirty="0">
+                          <a:solidFill>
+                            <a:schemeClr val="bg1"/>
+                          </a:solidFill>
+                        </a:rPr>
+                        <a:t>15:30 PM UTC</a:t>
+                      </a:r>
+                    </a:p>
+                  </a:txBody>
+                  <a:tcPr marL="45720" marR="45720" anchor="ctr">
+                    <a:lnL w="38100" cap="flat" cmpd="sng" algn="ctr">
+                      <a:solidFill>
+                        <a:schemeClr val="bg1"/>
+                      </a:solidFill>
+                      <a:prstDash val="solid"/>
+                      <a:round/>
+                      <a:headEnd type="none" w="med" len="med"/>
+                      <a:tailEnd type="none" w="med" len="med"/>
+                    </a:lnL>
+                  </a:tcPr>
+                </a:tc>
+                <a:extLst>
+                  <a:ext uri="{0D108BD9-81ED-4DB2-BD59-A6C34878D82A}">
+                    <a16:rowId xmlns:a16="http://schemas.microsoft.com/office/drawing/2014/main" val="647809018"/>
+                  </a:ext>
+                </a:extLst>
+              </a:tr>
+              <a:tr h="699840">
+                <a:tc>
+                  <a:txBody>
+                    <a:bodyPr/>
+                    <a:lstStyle/>
+                    <a:p>
+                      <a:pPr algn="ctr"/>
+                      <a:r>
+                        <a:rPr lang="en-US" sz="2000" dirty="0">
+                          <a:solidFill>
+                            <a:schemeClr val="bg1"/>
+                          </a:solidFill>
+                        </a:rPr>
+                        <a:t>High Priest Brad Gault</a:t>
+                      </a:r>
+                    </a:p>
+                    <a:p>
+                      <a:pPr algn="ctr"/>
+                      <a:endParaRPr lang="en-US" sz="1800" dirty="0">
+                        <a:solidFill>
+                          <a:schemeClr val="bg1"/>
+                        </a:solidFill>
+                      </a:endParaRPr>
+                    </a:p>
+                    <a:p>
+                      <a:pPr algn="ctr"/>
+                      <a:r>
+                        <a:rPr lang="en-US" sz="1800" u="sng" dirty="0">
+                          <a:solidFill>
+                            <a:schemeClr val="bg1"/>
+                          </a:solidFill>
+                        </a:rPr>
+                        <a:t>Evening Service</a:t>
+                      </a:r>
+                      <a:endParaRPr lang="en-US" sz="1800" u="none" dirty="0">
+                        <a:solidFill>
+                          <a:schemeClr val="bg1"/>
+                        </a:solidFill>
+                      </a:endParaRPr>
+                    </a:p>
+                    <a:p>
+                      <a:pPr algn="ctr"/>
+                      <a:r>
+                        <a:rPr lang="en-US" sz="1800" i="1" u="none" dirty="0">
+                          <a:solidFill>
+                            <a:schemeClr val="bg1"/>
+                          </a:solidFill>
+                        </a:rPr>
+                        <a:t>Summer Series @ Waldo</a:t>
+                      </a:r>
+                    </a:p>
+                    <a:p>
+                      <a:pPr algn="ctr"/>
+                      <a:r>
+                        <a:rPr lang="en-US" sz="1800" i="0" u="none" dirty="0">
+                          <a:solidFill>
+                            <a:schemeClr val="bg1"/>
+                          </a:solidFill>
+                        </a:rPr>
+                        <a:t>(no broadcast)</a:t>
+                      </a:r>
+                      <a:endParaRPr lang="en-US" sz="2000" i="0" u="sng" dirty="0">
+                        <a:solidFill>
+                          <a:schemeClr val="bg1"/>
+                        </a:solidFill>
+                      </a:endParaRPr>
+                    </a:p>
+                  </a:txBody>
+                  <a:tcPr marL="137160" marR="137160" marT="137160" marB="137160">
+                    <a:lnR w="38100" cap="flat" cmpd="sng" algn="ctr">
+                      <a:solidFill>
+                        <a:schemeClr val="bg1"/>
+                      </a:solidFill>
+                      <a:prstDash val="solid"/>
+                      <a:round/>
+                      <a:headEnd type="none" w="med" len="med"/>
+                      <a:tailEnd type="none" w="med" len="med"/>
+                    </a:lnR>
+                  </a:tcPr>
+                </a:tc>
+                <a:tc>
+                  <a:txBody>
+                    <a:bodyPr/>
+                    <a:lstStyle/>
+                    <a:p>
+                      <a:pPr algn="ctr"/>
+                      <a:r>
+                        <a:rPr lang="en-US" sz="2000" dirty="0">
+                          <a:solidFill>
+                            <a:schemeClr val="bg1"/>
+                          </a:solidFill>
+                        </a:rPr>
+                        <a:t>Elder Charles </a:t>
+                      </a:r>
+                      <a:r>
+                        <a:rPr lang="en-US" sz="2000" dirty="0" err="1">
+                          <a:solidFill>
+                            <a:schemeClr val="bg1"/>
+                          </a:solidFill>
+                        </a:rPr>
+                        <a:t>Zerr</a:t>
+                      </a:r>
+                      <a:endParaRPr lang="en-US" sz="2000" dirty="0">
+                        <a:solidFill>
+                          <a:schemeClr val="bg1"/>
+                        </a:solidFill>
+                      </a:endParaRPr>
+                    </a:p>
+                    <a:p>
+                      <a:pPr algn="ctr"/>
+                      <a:endParaRPr lang="en-US" sz="1800" dirty="0">
+                        <a:solidFill>
+                          <a:schemeClr val="bg1"/>
+                        </a:solidFill>
+                      </a:endParaRPr>
+                    </a:p>
+                    <a:p>
+                      <a:pPr algn="ctr"/>
+                      <a:r>
+                        <a:rPr lang="en-US" sz="1800" b="0" u="sng" dirty="0">
+                          <a:solidFill>
+                            <a:schemeClr val="bg1"/>
+                          </a:solidFill>
+                        </a:rPr>
+                        <a:t>Evening Service • 6:00 PM CST</a:t>
+                      </a:r>
+                    </a:p>
+                    <a:p>
+                      <a:pPr algn="ctr"/>
+                      <a:r>
+                        <a:rPr lang="en-US" sz="1800" i="1" u="none" dirty="0">
+                          <a:solidFill>
+                            <a:schemeClr val="bg1"/>
+                          </a:solidFill>
+                        </a:rPr>
+                        <a:t>Branch Open Forum</a:t>
+                      </a:r>
+                    </a:p>
+                    <a:p>
+                      <a:pPr algn="ctr"/>
+                      <a:r>
+                        <a:rPr lang="en-US" sz="1800" i="0" u="none" dirty="0">
+                          <a:solidFill>
+                            <a:schemeClr val="bg1"/>
+                          </a:solidFill>
+                        </a:rPr>
+                        <a:t>(no broadcast)</a:t>
+                      </a:r>
+                      <a:endParaRPr lang="en-US" sz="2000" i="0" u="sng" dirty="0">
+                        <a:solidFill>
+                          <a:schemeClr val="bg1"/>
+                        </a:solidFill>
+                      </a:endParaRPr>
+                    </a:p>
+                  </a:txBody>
+                  <a:tcPr marL="137160" marR="137160" marT="137160" marB="137160">
+                    <a:lnL w="38100" cap="flat" cmpd="sng" algn="ctr">
+                      <a:solidFill>
+                        <a:schemeClr val="bg1"/>
+                      </a:solidFill>
+                      <a:prstDash val="solid"/>
+                      <a:round/>
+                      <a:headEnd type="none" w="med" len="med"/>
+                      <a:tailEnd type="none" w="med" len="med"/>
+                    </a:lnL>
+                    <a:lnR w="38100" cap="flat" cmpd="sng" algn="ctr">
+                      <a:solidFill>
+                        <a:schemeClr val="bg1"/>
+                      </a:solidFill>
+                      <a:prstDash val="solid"/>
+                      <a:round/>
+                      <a:headEnd type="none" w="med" len="med"/>
+                      <a:tailEnd type="none" w="med" len="med"/>
+                    </a:lnR>
+                  </a:tcPr>
+                </a:tc>
+                <a:tc>
+                  <a:txBody>
+                    <a:bodyPr/>
+                    <a:lstStyle/>
+                    <a:p>
+                      <a:pPr algn="ctr"/>
+                      <a:r>
+                        <a:rPr lang="en-US" sz="2000" dirty="0">
+                          <a:solidFill>
+                            <a:schemeClr val="bg1"/>
+                          </a:solidFill>
+                        </a:rPr>
+                        <a:t>Elder Dennis King</a:t>
+                      </a:r>
+                    </a:p>
+                    <a:p>
+                      <a:pPr algn="ctr"/>
+                      <a:endParaRPr lang="en-US" sz="1800" dirty="0">
+                        <a:solidFill>
+                          <a:schemeClr val="bg1"/>
+                        </a:solidFill>
+                      </a:endParaRPr>
+                    </a:p>
+                    <a:p>
+                      <a:pPr algn="ctr"/>
+                      <a:r>
+                        <a:rPr lang="en-US" sz="1800" u="sng" dirty="0">
+                          <a:solidFill>
+                            <a:schemeClr val="bg1"/>
+                          </a:solidFill>
+                        </a:rPr>
+                        <a:t>Evening Service</a:t>
+                      </a:r>
+                      <a:endParaRPr lang="en-US" sz="1800" u="none" dirty="0">
+                        <a:solidFill>
+                          <a:schemeClr val="bg1"/>
+                        </a:solidFill>
+                      </a:endParaRPr>
+                    </a:p>
+                    <a:p>
+                      <a:pPr algn="ctr"/>
+                      <a:r>
+                        <a:rPr lang="en-US" sz="1800" i="1" u="none" dirty="0">
+                          <a:solidFill>
+                            <a:schemeClr val="bg1"/>
+                          </a:solidFill>
+                        </a:rPr>
+                        <a:t>Church Member’s Manual Class</a:t>
+                      </a:r>
+                    </a:p>
+                    <a:p>
+                      <a:pPr algn="ctr"/>
+                      <a:r>
+                        <a:rPr lang="en-US" sz="1800" i="0" u="none" dirty="0">
+                          <a:solidFill>
+                            <a:schemeClr val="bg1"/>
+                          </a:solidFill>
+                        </a:rPr>
+                        <a:t>(no broadcast)</a:t>
+                      </a:r>
+                      <a:endParaRPr lang="en-US" sz="2000" i="0" u="sng" dirty="0">
+                        <a:solidFill>
+                          <a:schemeClr val="bg1"/>
+                        </a:solidFill>
+                      </a:endParaRPr>
+                    </a:p>
+                  </a:txBody>
+                  <a:tcPr marL="137160" marR="137160" marT="137160" marB="137160">
+                    <a:lnL w="38100" cap="flat" cmpd="sng" algn="ctr">
+                      <a:solidFill>
+                        <a:schemeClr val="bg1"/>
+                      </a:solidFill>
+                      <a:prstDash val="solid"/>
+                      <a:round/>
+                      <a:headEnd type="none" w="med" len="med"/>
+                      <a:tailEnd type="none" w="med" len="med"/>
+                    </a:lnL>
+                  </a:tcPr>
+                </a:tc>
+                <a:extLst>
+                  <a:ext uri="{0D108BD9-81ED-4DB2-BD59-A6C34878D82A}">
+                    <a16:rowId xmlns:a16="http://schemas.microsoft.com/office/drawing/2014/main" val="2635806370"/>
+                  </a:ext>
+                </a:extLst>
+              </a:tr>
+            </a:tbl>
+          </a:graphicData>
+        </a:graphic>
+      </p:graphicFrame>
+    </p:spTree>
+    <p:extLst>
+      <p:ext uri="{BB962C8B-B14F-4D97-AF65-F5344CB8AC3E}">
+        <p14:creationId xmlns:p14="http://schemas.microsoft.com/office/powerpoint/2010/main" val="3338503325"/>
+      </p:ext>
+    </p:extLst>
+  </p:cSld>
+  <p:clrMapOvr>
+    <a:masterClrMapping/>
+  </p:clrMapOvr>
+</p:sld>
+</file>
+
+<file path=ppt/slides/slide2.xml><?xml version="1.0" encoding="utf-8"?>
+<p:sld xmlns:a="http://schemas.openxmlformats.org/drawingml/2006/main" xmlns:r="http://schemas.openxmlformats.org/officeDocument/2006/relationships" xmlns:p="http://schemas.openxmlformats.org/presentationml/2006/main">
+  <p:cSld>
+    <p:spTree>
+      <p:nvGrpSpPr>
+        <p:cNvPr id="1" name=""/>
+        <p:cNvGrpSpPr/>
+        <p:nvPr/>
+      </p:nvGrpSpPr>
+      <p:grpSpPr>
+        <a:xfrm>
+          <a:off x="0" y="0"/>
+          <a:ext cx="0" cy="0"/>
+          <a:chOff x="0" y="0"/>
+          <a:chExt cx="0" cy="0"/>
+        </a:xfrm>
+      </p:grpSpPr>
+      <p:grpSp>
+        <p:nvGrpSpPr>
+          <p:cNvPr id="6" name="Group 5">
+            <a:extLst>
+              <a:ext uri="{FF2B5EF4-FFF2-40B4-BE49-F238E27FC236}">
+                <a16:creationId xmlns:a16="http://schemas.microsoft.com/office/drawing/2014/main" id="{D17D02E7-3F0D-4273-B382-1CB172C5868F}"/>
+              </a:ext>
+            </a:extLst>
+          </p:cNvPr>
+          <p:cNvGrpSpPr/>
+          <p:nvPr/>
+        </p:nvGrpSpPr>
+        <p:grpSpPr>
+          <a:xfrm>
+            <a:off x="-258896" y="345232"/>
+            <a:ext cx="12709793" cy="597160"/>
+            <a:chOff x="0" y="37322"/>
+            <a:chExt cx="12192000" cy="597160"/>
+          </a:xfrm>
+          <a:effectLst>
+            <a:outerShdw blurRad="50800" dist="38100" dir="2700000" algn="tl" rotWithShape="0">
+              <a:prstClr val="black">
+                <a:alpha val="40000"/>
+              </a:prstClr>
+            </a:outerShdw>
+          </a:effectLst>
+        </p:grpSpPr>
+        <p:sp>
+          <p:nvSpPr>
+            <p:cNvPr id="4" name="Rectangle 3">
+              <a:extLst>
+                <a:ext uri="{FF2B5EF4-FFF2-40B4-BE49-F238E27FC236}">
+                  <a16:creationId xmlns:a16="http://schemas.microsoft.com/office/drawing/2014/main" id="{593D64DA-DCEB-4AA2-B312-515F146861D8}"/>
+                </a:ext>
+              </a:extLst>
+            </p:cNvPr>
+            <p:cNvSpPr/>
+            <p:nvPr/>
+          </p:nvSpPr>
+          <p:spPr>
+            <a:xfrm>
+              <a:off x="0" y="37322"/>
+              <a:ext cx="12192000" cy="597160"/>
+            </a:xfrm>
+            <a:prstGeom prst="rect">
+              <a:avLst/>
+            </a:prstGeom>
+            <a:solidFill>
+              <a:srgbClr val="A99A85"/>
+            </a:solidFill>
+            <a:ln>
+              <a:noFill/>
+            </a:ln>
+          </p:spPr>
+          <p:style>
+            <a:lnRef idx="2">
+              <a:schemeClr val="accent1">
+                <a:shade val="50000"/>
+              </a:schemeClr>
+            </a:lnRef>
+            <a:fillRef idx="1">
+              <a:schemeClr val="accent1"/>
+            </a:fillRef>
+            <a:effectRef idx="0">
+              <a:schemeClr val="accent1"/>
+            </a:effectRef>
+            <a:fontRef idx="minor">
+              <a:schemeClr val="lt1"/>
+            </a:fontRef>
+          </p:style>
+          <p:txBody>
+            <a:bodyPr rtlCol="0" anchor="ctr"/>
+            <a:lstStyle/>
+            <a:p>
+              <a:pPr algn="ctr"/>
+              <a:endParaRPr lang="en-US" sz="2000"/>
+            </a:p>
+          </p:txBody>
+        </p:sp>
+        <p:sp>
+          <p:nvSpPr>
+            <p:cNvPr id="5" name="TextBox 4">
+              <a:extLst>
+                <a:ext uri="{FF2B5EF4-FFF2-40B4-BE49-F238E27FC236}">
+                  <a16:creationId xmlns:a16="http://schemas.microsoft.com/office/drawing/2014/main" id="{7F6F85FF-5065-4709-8C26-12A905611F7A}"/>
+                </a:ext>
+              </a:extLst>
+            </p:cNvPr>
+            <p:cNvSpPr txBox="1"/>
+            <p:nvPr/>
+          </p:nvSpPr>
+          <p:spPr>
+            <a:xfrm>
+              <a:off x="2475722" y="90521"/>
+              <a:ext cx="7240556" cy="523220"/>
+            </a:xfrm>
+            <a:prstGeom prst="rect">
+              <a:avLst/>
+            </a:prstGeom>
+            <a:noFill/>
+          </p:spPr>
+          <p:txBody>
+            <a:bodyPr wrap="square" rtlCol="0" anchor="ctr">
+              <a:spAutoFit/>
+            </a:bodyPr>
+            <a:lstStyle/>
+            <a:p>
+              <a:pPr algn="ctr"/>
+              <a:r>
+                <a:rPr lang="en-US" sz="2800" dirty="0">
+                  <a:latin typeface="Pristina" panose="03060402040406080204" pitchFamily="66" charset="0"/>
+                </a:rPr>
+                <a:t>Zarahemla Branch</a:t>
+              </a:r>
+            </a:p>
+          </p:txBody>
+        </p:sp>
+      </p:grpSp>
+      <p:sp>
+        <p:nvSpPr>
+          <p:cNvPr id="9" name="Content Placeholder 8">
+            <a:extLst>
+              <a:ext uri="{FF2B5EF4-FFF2-40B4-BE49-F238E27FC236}">
+                <a16:creationId xmlns:a16="http://schemas.microsoft.com/office/drawing/2014/main" id="{86B58BAA-1EBC-4E6E-80D7-CA6A89DE4AB8}"/>
+              </a:ext>
+            </a:extLst>
+          </p:cNvPr>
+          <p:cNvSpPr>
+            <a:spLocks noGrp="1"/>
+          </p:cNvSpPr>
+          <p:nvPr>
+            <p:ph sz="half" idx="1"/>
+          </p:nvPr>
+        </p:nvSpPr>
+        <p:spPr>
+          <a:xfrm>
+            <a:off x="838200" y="1143343"/>
+            <a:ext cx="10515600" cy="1507094"/>
+          </a:xfrm>
+        </p:spPr>
+        <p:txBody>
+          <a:bodyPr anchor="ctr">
+            <a:normAutofit/>
+          </a:bodyPr>
+          <a:lstStyle/>
+          <a:p>
+            <a:pPr marL="0" indent="0" algn="ctr">
+              <a:buNone/>
+            </a:pPr>
+            <a:r>
+              <a:rPr lang="en-US" sz="2400" dirty="0">
+                <a:solidFill>
+                  <a:schemeClr val="bg1">
+                    <a:lumMod val="85000"/>
+                  </a:schemeClr>
+                </a:solidFill>
+                <a:effectLst>
+                  <a:outerShdw blurRad="50800" dist="38100" dir="2700000" algn="tl" rotWithShape="0">
+                    <a:prstClr val="black">
+                      <a:alpha val="40000"/>
+                    </a:prstClr>
+                  </a:outerShdw>
+                </a:effectLst>
+                <a:latin typeface="Open Sans" panose="020B0606030504020204" pitchFamily="34" charset="0"/>
+                <a:ea typeface="Open Sans" panose="020B0606030504020204" pitchFamily="34" charset="0"/>
+                <a:cs typeface="Open Sans" panose="020B0606030504020204" pitchFamily="34" charset="0"/>
+              </a:rPr>
+              <a:t>We are currently offline.</a:t>
+            </a:r>
+          </a:p>
+          <a:p>
+            <a:pPr marL="0" indent="0" algn="ctr">
+              <a:buNone/>
+            </a:pPr>
+            <a:endParaRPr lang="en-US" sz="2400" dirty="0">
+              <a:solidFill>
+                <a:schemeClr val="bg1">
+                  <a:lumMod val="85000"/>
+                </a:schemeClr>
+              </a:solidFill>
+              <a:effectLst>
+                <a:outerShdw blurRad="50800" dist="38100" dir="2700000" algn="tl" rotWithShape="0">
+                  <a:prstClr val="black">
+                    <a:alpha val="40000"/>
+                  </a:prstClr>
+                </a:outerShdw>
+              </a:effectLst>
+              <a:latin typeface="Open Sans" panose="020B0606030504020204" pitchFamily="34" charset="0"/>
+              <a:ea typeface="Open Sans" panose="020B0606030504020204" pitchFamily="34" charset="0"/>
+              <a:cs typeface="Open Sans" panose="020B0606030504020204" pitchFamily="34" charset="0"/>
+            </a:endParaRPr>
+          </a:p>
+          <a:p>
+            <a:pPr marL="0" indent="0" algn="ctr">
+              <a:buNone/>
+            </a:pPr>
+            <a:r>
+              <a:rPr lang="en-US" sz="2400" dirty="0">
+                <a:solidFill>
+                  <a:schemeClr val="bg1">
+                    <a:lumMod val="85000"/>
+                  </a:schemeClr>
+                </a:solidFill>
+                <a:effectLst>
+                  <a:outerShdw blurRad="50800" dist="38100" dir="2700000" algn="tl" rotWithShape="0">
+                    <a:prstClr val="black">
+                      <a:alpha val="40000"/>
+                    </a:prstClr>
+                  </a:outerShdw>
+                </a:effectLst>
+                <a:latin typeface="Open Sans" panose="020B0606030504020204" pitchFamily="34" charset="0"/>
+                <a:ea typeface="Open Sans" panose="020B0606030504020204" pitchFamily="34" charset="0"/>
+                <a:cs typeface="Open Sans" panose="020B0606030504020204" pitchFamily="34" charset="0"/>
+              </a:rPr>
+              <a:t>Please join us for Sunday Worship each Sunday at 10:30 AM CST.</a:t>
+            </a:r>
+          </a:p>
+        </p:txBody>
+      </p:sp>
+      <p:sp>
+        <p:nvSpPr>
+          <p:cNvPr id="10" name="Content Placeholder 9">
+            <a:extLst>
+              <a:ext uri="{FF2B5EF4-FFF2-40B4-BE49-F238E27FC236}">
+                <a16:creationId xmlns:a16="http://schemas.microsoft.com/office/drawing/2014/main" id="{A0894FBB-42B2-4E18-A40E-6A6A542B28F2}"/>
+              </a:ext>
+            </a:extLst>
+          </p:cNvPr>
+          <p:cNvSpPr>
+            <a:spLocks noGrp="1"/>
+          </p:cNvSpPr>
+          <p:nvPr>
+            <p:ph sz="half" idx="2"/>
+          </p:nvPr>
+        </p:nvSpPr>
+        <p:spPr>
+          <a:xfrm>
+            <a:off x="838200" y="2822713"/>
+            <a:ext cx="10515600" cy="3559526"/>
+          </a:xfrm>
+          <a:ln w="50800" cmpd="thickThin">
+            <a:solidFill>
+              <a:schemeClr val="bg1">
+                <a:lumMod val="75000"/>
+              </a:schemeClr>
+            </a:solidFill>
+          </a:ln>
+        </p:spPr>
+        <p:txBody>
+          <a:bodyPr anchor="t">
+            <a:normAutofit/>
+          </a:bodyPr>
+          <a:lstStyle/>
+          <a:p>
+            <a:pPr marL="0" indent="0" algn="ctr">
+              <a:buNone/>
+            </a:pPr>
+            <a:endParaRPr lang="en-US" sz="700" u="sng" dirty="0">
+              <a:solidFill>
+                <a:schemeClr val="bg1">
+                  <a:lumMod val="85000"/>
+                </a:schemeClr>
+              </a:solidFill>
+              <a:effectLst>
+                <a:outerShdw blurRad="50800" dist="38100" dir="2700000" algn="tl" rotWithShape="0">
+                  <a:prstClr val="black">
+                    <a:alpha val="40000"/>
+                  </a:prstClr>
+                </a:outerShdw>
+              </a:effectLst>
+              <a:latin typeface="Open Sans" panose="020B0606030504020204" pitchFamily="34" charset="0"/>
+              <a:ea typeface="Open Sans" panose="020B0606030504020204" pitchFamily="34" charset="0"/>
+              <a:cs typeface="Open Sans" panose="020B0606030504020204" pitchFamily="34" charset="0"/>
+            </a:endParaRPr>
+          </a:p>
+          <a:p>
+            <a:pPr marL="0" indent="0" algn="ctr">
+              <a:buNone/>
+            </a:pPr>
+            <a:r>
+              <a:rPr lang="en-US" sz="2400" u="sng" dirty="0">
+                <a:solidFill>
+                  <a:schemeClr val="bg1">
+                    <a:lumMod val="85000"/>
+                  </a:schemeClr>
+                </a:solidFill>
+                <a:effectLst>
+                  <a:outerShdw blurRad="50800" dist="38100" dir="2700000" algn="tl" rotWithShape="0">
+                    <a:prstClr val="black">
+                      <a:alpha val="40000"/>
+                    </a:prstClr>
+                  </a:outerShdw>
+                </a:effectLst>
+                <a:latin typeface="Open Sans" panose="020B0606030504020204" pitchFamily="34" charset="0"/>
+                <a:ea typeface="Open Sans" panose="020B0606030504020204" pitchFamily="34" charset="0"/>
+                <a:cs typeface="Open Sans" panose="020B0606030504020204" pitchFamily="34" charset="0"/>
+              </a:rPr>
+              <a:t>Upcoming Broadcasts:</a:t>
+            </a:r>
+          </a:p>
+        </p:txBody>
+      </p:sp>
+      <p:graphicFrame>
+        <p:nvGraphicFramePr>
+          <p:cNvPr id="2" name="Table 1">
+            <a:extLst>
+              <a:ext uri="{FF2B5EF4-FFF2-40B4-BE49-F238E27FC236}">
+                <a16:creationId xmlns:a16="http://schemas.microsoft.com/office/drawing/2014/main" id="{598D52B4-3D30-4B2F-B649-FBD6189666D7}"/>
+              </a:ext>
+            </a:extLst>
+          </p:cNvPr>
+          <p:cNvGraphicFramePr>
+            <a:graphicFrameLocks noGrp="1"/>
+          </p:cNvGraphicFramePr>
+          <p:nvPr>
+            <p:extLst>
+              <p:ext uri="{D42A27DB-BD31-4B8C-83A1-F6EECF244321}">
+                <p14:modId xmlns:p14="http://schemas.microsoft.com/office/powerpoint/2010/main" val="4203425780"/>
+              </p:ext>
+            </p:extLst>
+          </p:nvPr>
+        </p:nvGraphicFramePr>
+        <p:xfrm>
+          <a:off x="2392680" y="3624318"/>
+          <a:ext cx="7406640" cy="2622480"/>
+        </p:xfrm>
+        <a:graphic>
+          <a:graphicData uri="http://schemas.openxmlformats.org/drawingml/2006/table">
+            <a:tbl>
+              <a:tblPr firstRow="1" bandRow="1">
+                <a:tableStyleId>{2D5ABB26-0587-4C30-8999-92F81FD0307C}</a:tableStyleId>
+              </a:tblPr>
+              <a:tblGrid>
+                <a:gridCol w="3703320">
+                  <a:extLst>
+                    <a:ext uri="{9D8B030D-6E8A-4147-A177-3AD203B41FA5}">
+                      <a16:colId xmlns:a16="http://schemas.microsoft.com/office/drawing/2014/main" val="140136623"/>
+                    </a:ext>
+                  </a:extLst>
+                </a:gridCol>
+                <a:gridCol w="3703320">
+                  <a:extLst>
+                    <a:ext uri="{9D8B030D-6E8A-4147-A177-3AD203B41FA5}">
+                      <a16:colId xmlns:a16="http://schemas.microsoft.com/office/drawing/2014/main" val="2629175129"/>
+                    </a:ext>
+                  </a:extLst>
+                </a:gridCol>
+              </a:tblGrid>
+              <a:tr h="473040">
+                <a:tc>
+                  <a:txBody>
+                    <a:bodyPr/>
+                    <a:lstStyle/>
+                    <a:p>
+                      <a:pPr algn="ctr"/>
+                      <a:r>
+                        <a:rPr lang="en-US" sz="2000" b="1" dirty="0">
+                          <a:solidFill>
+                            <a:schemeClr val="bg1"/>
+                          </a:solidFill>
+                        </a:rPr>
                         <a:t>Sun, 1/20/19</a:t>
+                      </a:r>
+                    </a:p>
+                  </a:txBody>
+                  <a:tcPr marL="45720" marR="45720" anchor="b">
+                    <a:lnR w="38100" cap="flat" cmpd="sng" algn="ctr">
+                      <a:solidFill>
+                        <a:schemeClr val="bg1"/>
+                      </a:solidFill>
+                      <a:prstDash val="solid"/>
+                      <a:round/>
+                      <a:headEnd type="none" w="med" len="med"/>
+                      <a:tailEnd type="none" w="med" len="med"/>
+                    </a:lnR>
+                  </a:tcPr>
+                </a:tc>
+                <a:tc>
+                  <a:txBody>
+                    <a:bodyPr/>
+                    <a:lstStyle/>
+                    <a:p>
+                      <a:pPr algn="ctr"/>
+                      <a:r>
+                        <a:rPr lang="en-US" sz="2000" b="1" dirty="0">
+                          <a:solidFill>
+                            <a:schemeClr val="bg1"/>
+                          </a:solidFill>
+                        </a:rPr>
+                        <a:t>Sun, 1/27/19</a:t>
                       </a:r>
                     </a:p>
                   </a:txBody>
@@ -3943,43 +4801,6 @@
                       <a:headEnd type="none" w="med" len="med"/>
                       <a:tailEnd type="none" w="med" len="med"/>
                     </a:lnL>
-                    <a:lnR w="38100" cap="flat" cmpd="sng" algn="ctr">
-                      <a:solidFill>
-                        <a:schemeClr val="bg1"/>
-                      </a:solidFill>
-                      <a:prstDash val="solid"/>
-                      <a:round/>
-                      <a:headEnd type="none" w="med" len="med"/>
-                      <a:tailEnd type="none" w="med" len="med"/>
-                    </a:lnR>
-                  </a:tcPr>
-                </a:tc>
-                <a:tc>
-                  <a:txBody>
-                    <a:bodyPr/>
-                    <a:lstStyle/>
-                    <a:p>
-                      <a:pPr algn="ctr"/>
-                      <a:r>
-                        <a:rPr lang="en-US" sz="2000" b="1" dirty="0">
-                          <a:solidFill>
-                            <a:schemeClr val="bg1"/>
-                          </a:solidFill>
-                        </a:rPr>
-                        <a:t>10:30 AM CST • 16:30 PM UTC</a:t>
-                      </a:r>
-                    </a:p>
-                  </a:txBody>
-                  <a:tcPr marL="45720" marR="45720" anchor="ctr">
-                    <a:lnL w="38100" cap="flat" cmpd="sng" algn="ctr">
-                      <a:solidFill>
-                        <a:schemeClr val="bg1"/>
-                      </a:solidFill>
-                      <a:prstDash val="solid"/>
-                      <a:round/>
-                      <a:headEnd type="none" w="med" len="med"/>
-                      <a:tailEnd type="none" w="med" len="med"/>
-                    </a:lnL>
                   </a:tcPr>
                 </a:tc>
                 <a:extLst>
@@ -3989,162 +4810,6 @@
                 </a:extLst>
               </a:tr>
               <a:tr h="699840">
-                <a:tc>
-                  <a:txBody>
-                    <a:bodyPr/>
-                    <a:lstStyle/>
-                    <a:p>
-                      <a:pPr algn="ctr"/>
-                      <a:r>
-                        <a:rPr lang="en-US" sz="2000" dirty="0">
-                          <a:solidFill>
-                            <a:schemeClr val="bg1"/>
-                          </a:solidFill>
-                        </a:rPr>
-                        <a:t>Elder Abraham Forth</a:t>
-                      </a:r>
-                    </a:p>
-                    <a:p>
-                      <a:pPr algn="ctr"/>
-                      <a:endParaRPr lang="en-US" sz="1800" dirty="0">
-                        <a:solidFill>
-                          <a:schemeClr val="bg1"/>
-                        </a:solidFill>
-                      </a:endParaRPr>
-                    </a:p>
-                    <a:p>
-                      <a:pPr algn="ctr"/>
-                      <a:r>
-                        <a:rPr lang="en-US" sz="1800" u="sng" dirty="0">
-                          <a:solidFill>
-                            <a:schemeClr val="bg1"/>
-                          </a:solidFill>
-                        </a:rPr>
-                        <a:t>Evening Service</a:t>
-                      </a:r>
-                      <a:endParaRPr lang="en-US" sz="1800" u="none" dirty="0">
-                        <a:solidFill>
-                          <a:schemeClr val="bg1"/>
-                        </a:solidFill>
-                      </a:endParaRPr>
-                    </a:p>
-                    <a:p>
-                      <a:pPr algn="ctr"/>
-                      <a:r>
-                        <a:rPr lang="en-US" sz="1800" i="1" u="none" dirty="0">
-                          <a:solidFill>
-                            <a:schemeClr val="bg1"/>
-                          </a:solidFill>
-                        </a:rPr>
-                        <a:t>Prayer Service for Zion</a:t>
-                      </a:r>
-                    </a:p>
-                    <a:p>
-                      <a:pPr algn="ctr"/>
-                      <a:r>
-                        <a:rPr lang="en-US" sz="1800" i="0" u="none" dirty="0">
-                          <a:solidFill>
-                            <a:schemeClr val="bg1"/>
-                          </a:solidFill>
-                        </a:rPr>
-                        <a:t>(no broadcast)</a:t>
-                      </a:r>
-                      <a:endParaRPr lang="en-US" sz="2000" i="0" u="sng" dirty="0">
-                        <a:solidFill>
-                          <a:schemeClr val="bg1"/>
-                        </a:solidFill>
-                      </a:endParaRPr>
-                    </a:p>
-                  </a:txBody>
-                  <a:tcPr marL="137160" marR="137160" marT="137160" marB="137160">
-                    <a:lnR w="38100" cap="flat" cmpd="sng" algn="ctr">
-                      <a:solidFill>
-                        <a:schemeClr val="bg1"/>
-                      </a:solidFill>
-                      <a:prstDash val="solid"/>
-                      <a:round/>
-                      <a:headEnd type="none" w="med" len="med"/>
-                      <a:tailEnd type="none" w="med" len="med"/>
-                    </a:lnR>
-                  </a:tcPr>
-                </a:tc>
-                <a:tc>
-                  <a:txBody>
-                    <a:bodyPr/>
-                    <a:lstStyle/>
-                    <a:p>
-                      <a:pPr algn="ctr"/>
-                      <a:r>
-                        <a:rPr lang="en-US" sz="2000" dirty="0">
-                          <a:solidFill>
-                            <a:schemeClr val="bg1"/>
-                          </a:solidFill>
-                        </a:rPr>
-                        <a:t>Elder Dennis King</a:t>
-                      </a:r>
-                    </a:p>
-                    <a:p>
-                      <a:pPr algn="ctr"/>
-                      <a:endParaRPr lang="en-US" sz="1800" dirty="0">
-                        <a:solidFill>
-                          <a:schemeClr val="bg1"/>
-                        </a:solidFill>
-                      </a:endParaRPr>
-                    </a:p>
-                    <a:p>
-                      <a:pPr algn="ctr"/>
-                      <a:r>
-                        <a:rPr lang="en-US" sz="1800" u="sng" dirty="0">
-                          <a:solidFill>
-                            <a:schemeClr val="bg1"/>
-                          </a:solidFill>
-                        </a:rPr>
-                        <a:t>Evening Service</a:t>
-                      </a:r>
-                      <a:endParaRPr lang="en-US" sz="1800" u="none" dirty="0">
-                        <a:solidFill>
-                          <a:schemeClr val="bg1"/>
-                        </a:solidFill>
-                      </a:endParaRPr>
-                    </a:p>
-                    <a:p>
-                      <a:pPr algn="ctr"/>
-                      <a:r>
-                        <a:rPr lang="en-US" sz="1800" i="1" u="none" dirty="0">
-                          <a:solidFill>
-                            <a:schemeClr val="bg1"/>
-                          </a:solidFill>
-                        </a:rPr>
-                        <a:t>-- TBD --</a:t>
-                      </a:r>
-                      <a:endParaRPr lang="en-US" sz="2000" i="1" u="sng" dirty="0">
-                        <a:solidFill>
-                          <a:schemeClr val="bg1"/>
-                        </a:solidFill>
-                      </a:endParaRPr>
-                    </a:p>
-                  </a:txBody>
-                  <a:tcPr marL="137160" marR="137160" marT="137160" marB="137160">
-                    <a:lnL w="38100" cap="flat" cmpd="sng" algn="ctr">
-                      <a:solidFill>
-                        <a:schemeClr val="bg1"/>
-                      </a:solidFill>
-                      <a:prstDash val="solid"/>
-                      <a:round/>
-                      <a:headEnd type="none" w="med" len="med"/>
-                      <a:tailEnd type="none" w="med" len="med"/>
-                    </a:lnL>
-                    <a:lnR w="38100" cap="flat" cmpd="sng" algn="ctr">
-                      <a:solidFill>
-                        <a:schemeClr val="bg1"/>
-                      </a:solidFill>
-                      <a:prstDash val="solid"/>
-                      <a:round/>
-                      <a:headEnd type="none" w="med" len="med"/>
-                      <a:tailEnd type="none" w="med" len="med"/>
-                    </a:lnR>
-                  </a:tcPr>
-                </a:tc>
                 <a:tc>
                   <a:txBody>
                     <a:bodyPr/>
@@ -4226,6 +4891,90 @@
                     </a:p>
                   </a:txBody>
                   <a:tcPr marL="137160" marR="137160" marT="137160" marB="137160">
+                    <a:lnR w="38100" cap="flat" cmpd="sng" algn="ctr">
+                      <a:solidFill>
+                        <a:schemeClr val="bg1"/>
+                      </a:solidFill>
+                      <a:prstDash val="solid"/>
+                      <a:round/>
+                      <a:headEnd type="none" w="med" len="med"/>
+                      <a:tailEnd type="none" w="med" len="med"/>
+                    </a:lnR>
+                  </a:tcPr>
+                </a:tc>
+                <a:tc>
+                  <a:txBody>
+                    <a:bodyPr/>
+                    <a:lstStyle/>
+                    <a:p>
+                      <a:pPr algn="ctr"/>
+                      <a:r>
+                        <a:rPr lang="en-US" sz="2000" dirty="0">
+                          <a:solidFill>
+                            <a:schemeClr val="bg1"/>
+                          </a:solidFill>
+                        </a:rPr>
+                        <a:t>Elder Vern Allen</a:t>
+                      </a:r>
+                    </a:p>
+                    <a:p>
+                      <a:pPr algn="ctr"/>
+                      <a:endParaRPr lang="en-US" sz="1800" dirty="0">
+                        <a:solidFill>
+                          <a:schemeClr val="bg1"/>
+                        </a:solidFill>
+                      </a:endParaRPr>
+                    </a:p>
+                    <a:p>
+                      <a:pPr algn="ctr"/>
+                      <a:r>
+                        <a:rPr lang="en-US" sz="1800" u="sng" dirty="0">
+                          <a:solidFill>
+                            <a:schemeClr val="bg1"/>
+                          </a:solidFill>
+                        </a:rPr>
+                        <a:t>Evening Service</a:t>
+                      </a:r>
+                      <a:endParaRPr lang="en-US" sz="1800" u="none" dirty="0">
+                        <a:solidFill>
+                          <a:schemeClr val="bg1"/>
+                        </a:solidFill>
+                      </a:endParaRPr>
+                    </a:p>
+                    <a:p>
+                      <a:pPr algn="ctr"/>
+                      <a:r>
+                        <a:rPr lang="en-US" sz="1800" i="1" u="none" dirty="0" err="1">
+                          <a:solidFill>
+                            <a:schemeClr val="bg1"/>
+                          </a:solidFill>
+                        </a:rPr>
+                        <a:t>Religio</a:t>
+                      </a:r>
+                      <a:endParaRPr lang="en-US" sz="1800" i="1" u="none" dirty="0">
+                        <a:solidFill>
+                          <a:schemeClr val="bg1"/>
+                        </a:solidFill>
+                      </a:endParaRPr>
+                    </a:p>
+                    <a:p>
+                      <a:pPr algn="ctr"/>
+                      <a:r>
+                        <a:rPr lang="en-US" sz="1800" i="0" u="none" dirty="0">
+                          <a:solidFill>
+                            <a:schemeClr val="bg1"/>
+                          </a:solidFill>
+                        </a:rPr>
+                        <a:t>(no broadcast)</a:t>
+                      </a:r>
+                      <a:endParaRPr lang="en-US" sz="2000" i="0" u="sng" dirty="0">
+                        <a:solidFill>
+                          <a:schemeClr val="bg1"/>
+                        </a:solidFill>
+                      </a:endParaRPr>
+                    </a:p>
+                  </a:txBody>
+                  <a:tcPr marL="137160" marR="137160" marT="137160" marB="137160">
                     <a:lnL w="38100" cap="flat" cmpd="sng" algn="ctr">
                       <a:solidFill>
                         <a:schemeClr val="bg1"/>
@@ -4250,7 +4999,7 @@
     </p:spTree>
     <p:extLst>
       <p:ext uri="{BB962C8B-B14F-4D97-AF65-F5344CB8AC3E}">
-        <p14:creationId xmlns:p14="http://schemas.microsoft.com/office/powerpoint/2010/main" val="3338503325"/>
+        <p14:creationId xmlns:p14="http://schemas.microsoft.com/office/powerpoint/2010/main" val="3157888944"/>
       </p:ext>
     </p:extLst>
   </p:cSld>
@@ -4260,7 +5009,7 @@
 </p:sld>
 </file>
 
-<file path=ppt/slides/slide2.xml><?xml version="1.0" encoding="utf-8"?>
+<file path=ppt/slides/slide3.xml><?xml version="1.0" encoding="utf-8"?>
 <p:sld xmlns:a="http://schemas.openxmlformats.org/drawingml/2006/main" xmlns:r="http://schemas.openxmlformats.org/officeDocument/2006/relationships" xmlns:p="http://schemas.openxmlformats.org/presentationml/2006/main">
   <p:cSld>
     <p:spTree>

</xml_diff>